<commit_message>
Final Project Proposal v2
</commit_message>
<xml_diff>
--- a/Final Project Proposals.pptx
+++ b/Final Project Proposals.pptx
@@ -13622,7 +13622,11 @@
           <a:bodyPr/>
           <a:lstStyle/>
           <a:p>
-            <a:endParaRPr lang="en-US" dirty="0"/>
+            <a:pPr algn="ctr"/>
+            <a:r>
+              <a:rPr lang="en-US" sz="2800" dirty="0"/>
+              <a:t>PROJECT 1: PREDICTING EFFECTS OF PRENATAL VITAMINS DURING PREGNANCY</a:t>
+            </a:r>
           </a:p>
         </p:txBody>
       </p:sp>

</xml_diff>

<commit_message>
Final Project Proposals v3
</commit_message>
<xml_diff>
--- a/Final Project Proposals.pptx
+++ b/Final Project Proposals.pptx
@@ -14150,7 +14150,15 @@
           <a:p>
             <a:r>
               <a:rPr lang="en-US" dirty="0"/>
-              <a:t>The role of education in human and societal developmental cannot be overstated.</a:t>
+              <a:t>The role of education in human and societal </a:t>
+            </a:r>
+            <a:r>
+              <a:rPr lang="en-US" dirty="0" smtClean="0"/>
+              <a:t>development </a:t>
+            </a:r>
+            <a:r>
+              <a:rPr lang="en-US" dirty="0"/>
+              <a:t>cannot be overstated.</a:t>
             </a:r>
             <a:r>
               <a:rPr lang="en-US" dirty="0"/>
@@ -14161,7 +14169,26 @@
           <a:p>
             <a:r>
               <a:rPr lang="en-US" dirty="0"/>
-              <a:t>Starting from elementary and high schools, young minds are groomed and prepared to assume important roles in the workforce in due time. As a result, the impact associated with underfunding early educational institutions leaves many in the society under-educated and at a disadvantage in the contemporary, ultra-competitive world, and this project aims to highlight that.</a:t>
+              <a:t>Starting from elementary and high schools, young minds are groomed and prepared to assume important roles in the workforce in due time. </a:t>
+            </a:r>
+            <a:endParaRPr lang="en-US" dirty="0" smtClean="0"/>
+          </a:p>
+          <a:p>
+            <a:r>
+              <a:rPr lang="en-US" dirty="0" smtClean="0"/>
+              <a:t>As </a:t>
+            </a:r>
+            <a:r>
+              <a:rPr lang="en-US" dirty="0"/>
+              <a:t>a result, the impact associated with underfunding early educational institutions </a:t>
+            </a:r>
+            <a:r>
+              <a:rPr lang="en-US" dirty="0" smtClean="0"/>
+              <a:t>leave </a:t>
+            </a:r>
+            <a:r>
+              <a:rPr lang="en-US" dirty="0"/>
+              <a:t>many in the society under-educated and at a disadvantage in the contemporary, ultra-competitive world, and this project aims to highlight that.</a:t>
             </a:r>
             <a:r>
               <a:rPr lang="en-US" dirty="0"/>

</xml_diff>